<commit_message>
Did some more changes
</commit_message>
<xml_diff>
--- a/PPT.pptx
+++ b/PPT.pptx
@@ -17,9 +17,10 @@
     <p:sldId id="276" r:id="rId11"/>
     <p:sldId id="277" r:id="rId12"/>
     <p:sldId id="280" r:id="rId13"/>
-    <p:sldId id="274" r:id="rId14"/>
-    <p:sldId id="278" r:id="rId15"/>
-    <p:sldId id="279" r:id="rId16"/>
+    <p:sldId id="281" r:id="rId14"/>
+    <p:sldId id="274" r:id="rId15"/>
+    <p:sldId id="278" r:id="rId16"/>
+    <p:sldId id="279" r:id="rId17"/>
   </p:sldIdLst>
   <p:sldSz cx="12192000" cy="6858000"/>
   <p:notesSz cx="6858000" cy="9144000"/>
@@ -27932,24 +27933,44 @@
             </a:r>
           </a:p>
           <a:p>
+            <a:pPr>
+              <a:buClr>
+                <a:srgbClr val="00B0F0"/>
+              </a:buClr>
+            </a:pPr>
             <a:r>
               <a:rPr lang="en-US" sz="2000" dirty="0"/>
               <a:t>Pass/Fail status of test cases</a:t>
             </a:r>
           </a:p>
           <a:p>
+            <a:pPr>
+              <a:buClr>
+                <a:srgbClr val="00B0F0"/>
+              </a:buClr>
+            </a:pPr>
             <a:r>
               <a:rPr lang="en-US" sz="2000" dirty="0"/>
               <a:t>Execution trends over sprints</a:t>
             </a:r>
           </a:p>
           <a:p>
+            <a:pPr>
+              <a:buClr>
+                <a:srgbClr val="00B0F0"/>
+              </a:buClr>
+            </a:pPr>
             <a:r>
               <a:rPr lang="en-US" sz="2000" dirty="0"/>
               <a:t>Defect mapping with Jira.</a:t>
             </a:r>
           </a:p>
           <a:p>
+            <a:pPr>
+              <a:buClr>
+                <a:srgbClr val="00B0F0"/>
+              </a:buClr>
+            </a:pPr>
             <a:r>
               <a:rPr lang="en-US" sz="2000" dirty="0"/>
               <a:t>Reports helped stakeholders review quality metrics efficiently.</a:t>
@@ -28096,7 +28117,7 @@
       </p:grpSpPr>
       <p:sp useBgFill="1">
         <p:nvSpPr>
-          <p:cNvPr id="28" name="Slide Background">
+          <p:cNvPr id="33" name="Slide Background">
             <a:extLst>
               <a:ext uri="{FF2B5EF4-FFF2-40B4-BE49-F238E27FC236}">
                 <a16:creationId xmlns:a16="http://schemas.microsoft.com/office/drawing/2014/main" id="{9E6671AF-110C-4E4D-BEB4-1323A3136D1B}"/>
@@ -28248,10 +28269,10 @@
       </p:sp>
       <p:pic>
         <p:nvPicPr>
-          <p:cNvPr id="9" name="Picture 8" descr="A screenshot of a graph&#10;&#10;AI-generated content may be incorrect.">
+          <p:cNvPr id="5" name="Picture 4" descr="A screenshot of a computer&#10;&#10;AI-generated content may be incorrect.">
             <a:extLst>
               <a:ext uri="{FF2B5EF4-FFF2-40B4-BE49-F238E27FC236}">
-                <a16:creationId xmlns:a16="http://schemas.microsoft.com/office/drawing/2014/main" id="{A9DD40F3-0A50-9A00-263C-DA30C0B73F17}"/>
+                <a16:creationId xmlns:a16="http://schemas.microsoft.com/office/drawing/2014/main" id="{12A0808E-084B-9813-7A2E-D449394D2308}"/>
               </a:ext>
             </a:extLst>
           </p:cNvPr>
@@ -28262,7 +28283,7 @@
         </p:nvPicPr>
         <p:blipFill>
           <a:blip r:embed="rId2"/>
-          <a:srcRect t="1837" b="12719"/>
+          <a:srcRect l="106" r="-106" b="24156"/>
           <a:stretch>
             <a:fillRect/>
           </a:stretch>
@@ -28298,6 +28319,182 @@
 </file>
 
 <file path=ppt/slides/slide12.xml><?xml version="1.0" encoding="utf-8"?>
+<p:sld xmlns:a="http://schemas.openxmlformats.org/drawingml/2006/main" xmlns:r="http://schemas.openxmlformats.org/officeDocument/2006/relationships" xmlns:p="http://schemas.openxmlformats.org/presentationml/2006/main">
+  <p:cSld>
+    <p:bg>
+      <p:bgPr>
+        <a:solidFill>
+          <a:schemeClr val="bg1"/>
+        </a:solidFill>
+        <a:effectLst/>
+      </p:bgPr>
+    </p:bg>
+    <p:spTree>
+      <p:nvGrpSpPr>
+        <p:cNvPr id="1" name=""/>
+        <p:cNvGrpSpPr/>
+        <p:nvPr/>
+      </p:nvGrpSpPr>
+      <p:grpSpPr>
+        <a:xfrm>
+          <a:off x="0" y="0"/>
+          <a:ext cx="0" cy="0"/>
+          <a:chOff x="0" y="0"/>
+          <a:chExt cx="0" cy="0"/>
+        </a:xfrm>
+      </p:grpSpPr>
+      <p:sp useBgFill="1">
+        <p:nvSpPr>
+          <p:cNvPr id="10" name="Rectangle 9">
+            <a:extLst>
+              <a:ext uri="{FF2B5EF4-FFF2-40B4-BE49-F238E27FC236}">
+                <a16:creationId xmlns:a16="http://schemas.microsoft.com/office/drawing/2014/main" id="{E722B2DD-E14D-4972-9D98-5D6E61B1B2D2}"/>
+              </a:ext>
+              <a:ext uri="{C183D7F6-B498-43B3-948B-1728B52AA6E4}">
+                <adec:decorative xmlns:adec="http://schemas.microsoft.com/office/drawing/2017/decorative" val="1"/>
+              </a:ext>
+            </a:extLst>
+          </p:cNvPr>
+          <p:cNvSpPr>
+            <a:spLocks noGrp="1" noRot="1" noChangeAspect="1" noMove="1" noResize="1" noEditPoints="1" noAdjustHandles="1" noChangeArrowheads="1" noChangeShapeType="1" noTextEdit="1"/>
+          </p:cNvSpPr>
+          <p:nvPr>
+            <p:extLst>
+              <p:ext uri="{386F3935-93C4-4BCD-93E2-E3B085C9AB24}">
+                <p16:designElem xmlns:p16="http://schemas.microsoft.com/office/powerpoint/2015/main" val="1"/>
+              </p:ext>
+            </p:extLst>
+          </p:nvPr>
+        </p:nvSpPr>
+        <p:spPr>
+          <a:xfrm>
+            <a:off x="0" y="0"/>
+            <a:ext cx="12192000" cy="6858000"/>
+          </a:xfrm>
+          <a:prstGeom prst="rect">
+            <a:avLst/>
+          </a:prstGeom>
+          <a:ln>
+            <a:noFill/>
+          </a:ln>
+          <a:effectLst/>
+        </p:spPr>
+        <p:style>
+          <a:lnRef idx="2">
+            <a:schemeClr val="accent1">
+              <a:shade val="50000"/>
+            </a:schemeClr>
+          </a:lnRef>
+          <a:fillRef idx="1">
+            <a:schemeClr val="accent1"/>
+          </a:fillRef>
+          <a:effectRef idx="0">
+            <a:schemeClr val="accent1"/>
+          </a:effectRef>
+          <a:fontRef idx="minor">
+            <a:schemeClr val="lt1"/>
+          </a:fontRef>
+        </p:style>
+        <p:txBody>
+          <a:bodyPr rtlCol="0" anchor="ctr"/>
+          <a:lstStyle/>
+          <a:p>
+            <a:pPr algn="ctr"/>
+            <a:endParaRPr lang="en-US"/>
+          </a:p>
+        </p:txBody>
+      </p:sp>
+      <p:pic>
+        <p:nvPicPr>
+          <p:cNvPr id="5" name="Content Placeholder 4" descr="A screenshot of a computer code&#10;&#10;AI-generated content may be incorrect.">
+            <a:extLst>
+              <a:ext uri="{FF2B5EF4-FFF2-40B4-BE49-F238E27FC236}">
+                <a16:creationId xmlns:a16="http://schemas.microsoft.com/office/drawing/2014/main" id="{5BA50A6A-1587-46F0-F112-413D4901EEFD}"/>
+              </a:ext>
+            </a:extLst>
+          </p:cNvPr>
+          <p:cNvPicPr>
+            <a:picLocks noGrp="1" noChangeAspect="1"/>
+          </p:cNvPicPr>
+          <p:nvPr>
+            <p:ph idx="1"/>
+          </p:nvPr>
+        </p:nvPicPr>
+        <p:blipFill>
+          <a:blip r:embed="rId2"/>
+          <a:srcRect t="1158" r="141" b="1"/>
+          <a:stretch>
+            <a:fillRect/>
+          </a:stretch>
+        </p:blipFill>
+        <p:spPr>
+          <a:xfrm>
+            <a:off x="0" y="0"/>
+            <a:ext cx="12192000" cy="5551148"/>
+          </a:xfrm>
+          <a:prstGeom prst="rect">
+            <a:avLst/>
+          </a:prstGeom>
+          <a:ln>
+            <a:noFill/>
+          </a:ln>
+          <a:effectLst>
+            <a:outerShdw blurRad="292100" dist="165100" dir="6000000" sx="97000" sy="97000" algn="t" rotWithShape="0">
+              <a:prstClr val="black">
+                <a:alpha val="35000"/>
+              </a:prstClr>
+            </a:outerShdw>
+          </a:effectLst>
+        </p:spPr>
+      </p:pic>
+      <p:pic>
+        <p:nvPicPr>
+          <p:cNvPr id="7" name="Picture 6">
+            <a:extLst>
+              <a:ext uri="{FF2B5EF4-FFF2-40B4-BE49-F238E27FC236}">
+                <a16:creationId xmlns:a16="http://schemas.microsoft.com/office/drawing/2014/main" id="{9B79F776-B863-34BA-AFDF-58EB78D99194}"/>
+              </a:ext>
+            </a:extLst>
+          </p:cNvPr>
+          <p:cNvPicPr>
+            <a:picLocks noChangeAspect="1"/>
+          </p:cNvPicPr>
+          <p:nvPr/>
+        </p:nvPicPr>
+        <p:blipFill>
+          <a:blip r:embed="rId3"/>
+          <a:srcRect t="38474" b="10941"/>
+          <a:stretch>
+            <a:fillRect/>
+          </a:stretch>
+        </p:blipFill>
+        <p:spPr>
+          <a:xfrm>
+            <a:off x="0" y="4080386"/>
+            <a:ext cx="12192000" cy="2753033"/>
+          </a:xfrm>
+          <a:prstGeom prst="rect">
+            <a:avLst/>
+          </a:prstGeom>
+          <a:ln>
+            <a:noFill/>
+          </a:ln>
+        </p:spPr>
+      </p:pic>
+    </p:spTree>
+    <p:extLst>
+      <p:ext uri="{BB962C8B-B14F-4D97-AF65-F5344CB8AC3E}">
+        <p14:creationId xmlns:p14="http://schemas.microsoft.com/office/powerpoint/2010/main" val="3815609693"/>
+      </p:ext>
+    </p:extLst>
+  </p:cSld>
+  <p:clrMapOvr>
+    <a:masterClrMapping/>
+  </p:clrMapOvr>
+</p:sld>
+</file>
+
+<file path=ppt/slides/slide13.xml><?xml version="1.0" encoding="utf-8"?>
 <p:sld xmlns:a="http://schemas.openxmlformats.org/drawingml/2006/main" xmlns:r="http://schemas.openxmlformats.org/officeDocument/2006/relationships" xmlns:p="http://schemas.openxmlformats.org/presentationml/2006/main">
   <p:cSld>
     <p:bg>
@@ -28670,6 +28867,9 @@
           <a:lstStyle/>
           <a:p>
             <a:pPr>
+              <a:buClr>
+                <a:srgbClr val="00B0F0"/>
+              </a:buClr>
               <a:buFont typeface="Wingdings" panose="05000000000000000000" pitchFamily="2" charset="2"/>
               <a:buChar char="§"/>
             </a:pPr>
@@ -28680,6 +28880,9 @@
           </a:p>
           <a:p>
             <a:pPr>
+              <a:buClr>
+                <a:srgbClr val="00B0F0"/>
+              </a:buClr>
               <a:buFont typeface="Wingdings" panose="05000000000000000000" pitchFamily="2" charset="2"/>
               <a:buChar char="§"/>
             </a:pPr>
@@ -28690,6 +28893,9 @@
           </a:p>
           <a:p>
             <a:pPr>
+              <a:buClr>
+                <a:srgbClr val="00B0F0"/>
+              </a:buClr>
               <a:buFont typeface="Wingdings" panose="05000000000000000000" pitchFamily="2" charset="2"/>
               <a:buChar char="§"/>
             </a:pPr>
@@ -28700,6 +28906,9 @@
           </a:p>
           <a:p>
             <a:pPr>
+              <a:buClr>
+                <a:srgbClr val="00B0F0"/>
+              </a:buClr>
               <a:buFont typeface="Wingdings" panose="05000000000000000000" pitchFamily="2" charset="2"/>
               <a:buChar char="§"/>
             </a:pPr>
@@ -28710,6 +28919,9 @@
           </a:p>
           <a:p>
             <a:pPr marL="0" indent="0">
+              <a:buClr>
+                <a:srgbClr val="00B0F0"/>
+              </a:buClr>
               <a:buNone/>
             </a:pPr>
             <a:endParaRPr lang="en-IN" sz="2000" dirty="0"/>
@@ -28729,7 +28941,7 @@
 </p:sld>
 </file>
 
-<file path=ppt/slides/slide13.xml><?xml version="1.0" encoding="utf-8"?>
+<file path=ppt/slides/slide14.xml><?xml version="1.0" encoding="utf-8"?>
 <p:sld xmlns:a="http://schemas.openxmlformats.org/drawingml/2006/main" xmlns:r="http://schemas.openxmlformats.org/officeDocument/2006/relationships" xmlns:p="http://schemas.openxmlformats.org/presentationml/2006/main">
   <p:cSld>
     <p:bg>
@@ -29227,7 +29439,7 @@
 </p:sld>
 </file>
 
-<file path=ppt/slides/slide14.xml><?xml version="1.0" encoding="utf-8"?>
+<file path=ppt/slides/slide15.xml><?xml version="1.0" encoding="utf-8"?>
 <p:sld xmlns:a="http://schemas.openxmlformats.org/drawingml/2006/main" xmlns:r="http://schemas.openxmlformats.org/officeDocument/2006/relationships" xmlns:p="http://schemas.openxmlformats.org/presentationml/2006/main">
   <p:cSld>
     <p:bg>
@@ -29616,7 +29828,12 @@
             <p:ph type="title"/>
           </p:nvPr>
         </p:nvSpPr>
-        <p:spPr/>
+        <p:spPr>
+          <a:xfrm>
+            <a:off x="1024127" y="585216"/>
+            <a:ext cx="10390305" cy="1499616"/>
+          </a:xfrm>
+        </p:spPr>
         <p:txBody>
           <a:bodyPr/>
           <a:lstStyle/>
@@ -29654,7 +29871,7 @@
         <p:spPr bwMode="auto">
           <a:xfrm>
             <a:off x="777567" y="1868737"/>
-            <a:ext cx="9121877" cy="4703852"/>
+            <a:ext cx="10636865" cy="4703852"/>
           </a:xfrm>
           <a:prstGeom prst="rect">
             <a:avLst/>
@@ -30547,6 +30764,11 @@
           </a:bodyPr>
           <a:lstStyle/>
           <a:p>
+            <a:pPr>
+              <a:buClr>
+                <a:srgbClr val="00B0F0"/>
+              </a:buClr>
+            </a:pPr>
             <a:r>
               <a:rPr lang="en-IN" sz="2400" dirty="0" err="1"/>
               <a:t>src</a:t>
@@ -30557,6 +30779,11 @@
             </a:r>
           </a:p>
           <a:p>
+            <a:pPr>
+              <a:buClr>
+                <a:srgbClr val="00B0F0"/>
+              </a:buClr>
+            </a:pPr>
             <a:r>
               <a:rPr lang="en-IN" sz="2400" dirty="0" err="1"/>
               <a:t>src</a:t>
@@ -30567,18 +30794,33 @@
             </a:r>
           </a:p>
           <a:p>
+            <a:pPr>
+              <a:buClr>
+                <a:srgbClr val="00B0F0"/>
+              </a:buClr>
+            </a:pPr>
             <a:r>
               <a:rPr lang="en-IN" sz="2400" dirty="0"/>
               <a:t>testng.xml – Suite configuration</a:t>
             </a:r>
           </a:p>
           <a:p>
+            <a:pPr>
+              <a:buClr>
+                <a:srgbClr val="00B0F0"/>
+              </a:buClr>
+            </a:pPr>
             <a:r>
               <a:rPr lang="en-IN" sz="2400" dirty="0"/>
               <a:t>pom.xml – Maven dependency file</a:t>
             </a:r>
           </a:p>
           <a:p>
+            <a:pPr>
+              <a:buClr>
+                <a:srgbClr val="00B0F0"/>
+              </a:buClr>
+            </a:pPr>
             <a:r>
               <a:rPr lang="en-IN" sz="2400" dirty="0"/>
               <a:t>resources/ – Test data, config files</a:t>
@@ -31023,30 +31265,65 @@
           </a:bodyPr>
           <a:lstStyle/>
           <a:p>
+            <a:pPr>
+              <a:buClr>
+                <a:srgbClr val="00B0F0"/>
+              </a:buClr>
+              <a:buFont typeface="Wingdings" panose="05000000000000000000" pitchFamily="2" charset="2"/>
+              <a:buChar char="q"/>
+            </a:pPr>
             <a:r>
               <a:rPr lang="en-IN" sz="2400" dirty="0"/>
               <a:t>Valid Login</a:t>
             </a:r>
           </a:p>
           <a:p>
+            <a:pPr>
+              <a:buClr>
+                <a:srgbClr val="00B0F0"/>
+              </a:buClr>
+              <a:buFont typeface="Wingdings" panose="05000000000000000000" pitchFamily="2" charset="2"/>
+              <a:buChar char="q"/>
+            </a:pPr>
             <a:r>
               <a:rPr lang="en-IN" sz="2400" dirty="0"/>
               <a:t>Invalid Login (wrong username/password)</a:t>
             </a:r>
           </a:p>
           <a:p>
+            <a:pPr>
+              <a:buClr>
+                <a:srgbClr val="00B0F0"/>
+              </a:buClr>
+              <a:buFont typeface="Wingdings" panose="05000000000000000000" pitchFamily="2" charset="2"/>
+              <a:buChar char="q"/>
+            </a:pPr>
             <a:r>
               <a:rPr lang="en-IN" sz="2400" dirty="0"/>
               <a:t>Add Item to Cart</a:t>
             </a:r>
           </a:p>
           <a:p>
+            <a:pPr>
+              <a:buClr>
+                <a:srgbClr val="00B0F0"/>
+              </a:buClr>
+              <a:buFont typeface="Wingdings" panose="05000000000000000000" pitchFamily="2" charset="2"/>
+              <a:buChar char="q"/>
+            </a:pPr>
             <a:r>
               <a:rPr lang="en-IN" sz="2400" dirty="0"/>
               <a:t>Remove Item from Cart</a:t>
             </a:r>
           </a:p>
           <a:p>
+            <a:pPr>
+              <a:buClr>
+                <a:srgbClr val="00B0F0"/>
+              </a:buClr>
+              <a:buFont typeface="Wingdings" panose="05000000000000000000" pitchFamily="2" charset="2"/>
+              <a:buChar char="q"/>
+            </a:pPr>
             <a:r>
               <a:rPr lang="en-IN" sz="2400" dirty="0"/>
               <a:t>Checkout Flow (from cart to confirmation) </a:t>
@@ -31398,7 +31675,7 @@
           </a:xfrm>
         </p:spPr>
         <p:txBody>
-          <a:bodyPr anchor="b">
+          <a:bodyPr anchor="ctr">
             <a:normAutofit/>
           </a:bodyPr>
           <a:lstStyle/>
@@ -31440,63 +31717,93 @@
           <a:lstStyle/>
           <a:p>
             <a:pPr>
+              <a:buClr>
+                <a:srgbClr val="00B0F0"/>
+              </a:buClr>
               <a:buFont typeface="Wingdings" panose="05000000000000000000" pitchFamily="2" charset="2"/>
               <a:buChar char="q"/>
             </a:pPr>
             <a:r>
-              <a:rPr lang="en-US" sz="2000" b="1"/>
+              <a:rPr lang="en-US" sz="2000" b="1" dirty="0"/>
               <a:t>Manual Testing:</a:t>
             </a:r>
           </a:p>
           <a:p>
-            <a:pPr lvl="1"/>
+            <a:pPr lvl="1">
+              <a:buClr>
+                <a:srgbClr val="00B0F0"/>
+              </a:buClr>
+            </a:pPr>
             <a:r>
-              <a:rPr lang="en-US" sz="2000"/>
+              <a:rPr lang="en-US" sz="2000" dirty="0"/>
               <a:t>Functional testing</a:t>
             </a:r>
           </a:p>
           <a:p>
-            <a:pPr lvl="1"/>
+            <a:pPr lvl="1">
+              <a:buClr>
+                <a:srgbClr val="00B0F0"/>
+              </a:buClr>
+            </a:pPr>
             <a:r>
-              <a:rPr lang="en-US" sz="2000"/>
+              <a:rPr lang="en-US" sz="2000" dirty="0"/>
               <a:t>Regression testing</a:t>
             </a:r>
           </a:p>
           <a:p>
-            <a:pPr lvl="1"/>
+            <a:pPr lvl="1">
+              <a:buClr>
+                <a:srgbClr val="00B0F0"/>
+              </a:buClr>
+            </a:pPr>
             <a:r>
-              <a:rPr lang="en-US" sz="2000"/>
+              <a:rPr lang="en-US" sz="2000" dirty="0"/>
               <a:t>Exploratory testing</a:t>
             </a:r>
           </a:p>
           <a:p>
             <a:pPr>
+              <a:buClr>
+                <a:srgbClr val="00B0F0"/>
+              </a:buClr>
               <a:buFont typeface="Wingdings" panose="05000000000000000000" pitchFamily="2" charset="2"/>
               <a:buChar char="q"/>
             </a:pPr>
             <a:r>
-              <a:rPr lang="en-US" sz="2000" b="1"/>
+              <a:rPr lang="en-US" sz="2000" b="1" dirty="0"/>
               <a:t>Automation Testing:</a:t>
             </a:r>
           </a:p>
           <a:p>
-            <a:pPr lvl="1"/>
+            <a:pPr lvl="1">
+              <a:buClr>
+                <a:srgbClr val="00B0F0"/>
+              </a:buClr>
+            </a:pPr>
             <a:r>
-              <a:rPr lang="en-US" sz="2000"/>
+              <a:rPr lang="en-US" sz="2000" dirty="0"/>
               <a:t>Selenium WebDriver with Java</a:t>
             </a:r>
           </a:p>
           <a:p>
-            <a:pPr lvl="1"/>
+            <a:pPr lvl="1">
+              <a:buClr>
+                <a:srgbClr val="00B0F0"/>
+              </a:buClr>
+            </a:pPr>
             <a:r>
-              <a:rPr lang="en-US" sz="2000"/>
+              <a:rPr lang="en-US" sz="2000" dirty="0"/>
               <a:t>Maven for build management</a:t>
             </a:r>
           </a:p>
           <a:p>
-            <a:pPr lvl="1"/>
+            <a:pPr lvl="1">
+              <a:buClr>
+                <a:srgbClr val="00B0F0"/>
+              </a:buClr>
+            </a:pPr>
             <a:r>
-              <a:rPr lang="en-US" sz="2000"/>
+              <a:rPr lang="en-US" sz="2000" dirty="0"/>
               <a:t>Jenkins for CI/CD</a:t>
             </a:r>
           </a:p>
@@ -31792,7 +32099,7 @@
           </a:xfrm>
         </p:spPr>
         <p:txBody>
-          <a:bodyPr anchor="ctr">
+          <a:bodyPr anchor="t">
             <a:normAutofit/>
           </a:bodyPr>
           <a:lstStyle/>
@@ -31806,18 +32113,33 @@
             </a:r>
           </a:p>
           <a:p>
+            <a:pPr>
+              <a:buClr>
+                <a:srgbClr val="00B0F0"/>
+              </a:buClr>
+            </a:pPr>
             <a:r>
               <a:rPr lang="en-IN" sz="2400" dirty="0"/>
               <a:t>Selenium WebDriver with Java</a:t>
             </a:r>
           </a:p>
           <a:p>
+            <a:pPr>
+              <a:buClr>
+                <a:srgbClr val="00B0F0"/>
+              </a:buClr>
+            </a:pPr>
             <a:r>
               <a:rPr lang="en-IN" sz="2400" dirty="0"/>
               <a:t>Page Object Model for maintainability</a:t>
             </a:r>
           </a:p>
           <a:p>
+            <a:pPr>
+              <a:buClr>
+                <a:srgbClr val="00B0F0"/>
+              </a:buClr>
+            </a:pPr>
             <a:r>
               <a:rPr lang="en-IN" sz="2400" dirty="0"/>
               <a:t>Maven for build execution</a:t>
@@ -32302,36 +32624,56 @@
               <a:buNone/>
             </a:pPr>
             <a:r>
-              <a:rPr lang="en-IN" sz="2000"/>
+              <a:rPr lang="en-IN" sz="2000" dirty="0"/>
               <a:t>Followed a structured automation approach:</a:t>
             </a:r>
           </a:p>
           <a:p>
+            <a:pPr>
+              <a:buClr>
+                <a:srgbClr val="00B0F0"/>
+              </a:buClr>
+            </a:pPr>
             <a:r>
-              <a:rPr lang="en-IN" sz="2000"/>
+              <a:rPr lang="en-IN" sz="2000" dirty="0"/>
               <a:t>Page Object Model for modular design</a:t>
             </a:r>
           </a:p>
           <a:p>
+            <a:pPr>
+              <a:buClr>
+                <a:srgbClr val="00B0F0"/>
+              </a:buClr>
+            </a:pPr>
             <a:r>
-              <a:rPr lang="en-IN" sz="2000"/>
+              <a:rPr lang="en-IN" sz="2000" dirty="0"/>
               <a:t>Data Driven Testing for scalability</a:t>
             </a:r>
           </a:p>
           <a:p>
+            <a:pPr>
+              <a:buClr>
+                <a:srgbClr val="00B0F0"/>
+              </a:buClr>
+            </a:pPr>
             <a:r>
-              <a:rPr lang="en-IN" sz="2000"/>
+              <a:rPr lang="en-IN" sz="2000" dirty="0"/>
               <a:t>Cross Browser Testing (Chrome, Firefox, Edge)</a:t>
             </a:r>
           </a:p>
           <a:p>
+            <a:pPr>
+              <a:buClr>
+                <a:srgbClr val="00B0F0"/>
+              </a:buClr>
+            </a:pPr>
             <a:r>
-              <a:rPr lang="en-IN" sz="2000"/>
+              <a:rPr lang="en-IN" sz="2000" dirty="0"/>
               <a:t>Integrated reporting and logging for execution results</a:t>
             </a:r>
           </a:p>
           <a:p>
-            <a:endParaRPr lang="en-IN" sz="2000"/>
+            <a:endParaRPr lang="en-IN" sz="2000" dirty="0"/>
           </a:p>
         </p:txBody>
       </p:sp>
@@ -32890,30 +33232,45 @@
               <a:buNone/>
             </a:pPr>
             <a:r>
-              <a:rPr lang="en-US" sz="1800"/>
+              <a:rPr lang="en-US" sz="1800" dirty="0"/>
               <a:t>Used Jira for Agile project management:</a:t>
             </a:r>
           </a:p>
           <a:p>
+            <a:pPr>
+              <a:buClr>
+                <a:srgbClr val="00B0F0"/>
+              </a:buClr>
+            </a:pPr>
             <a:r>
-              <a:rPr lang="en-US" sz="1800"/>
+              <a:rPr lang="en-US" sz="1800" dirty="0"/>
               <a:t>Backlog managed with user stories and tasks.</a:t>
             </a:r>
           </a:p>
           <a:p>
+            <a:pPr>
+              <a:buClr>
+                <a:srgbClr val="00B0F0"/>
+              </a:buClr>
+            </a:pPr>
             <a:r>
-              <a:rPr lang="en-US" sz="1800"/>
+              <a:rPr lang="en-US" sz="1800" dirty="0"/>
               <a:t>Sprint planning and tracking.</a:t>
             </a:r>
           </a:p>
           <a:p>
+            <a:pPr>
+              <a:buClr>
+                <a:srgbClr val="00B0F0"/>
+              </a:buClr>
+            </a:pPr>
             <a:r>
-              <a:rPr lang="en-US" sz="1800"/>
+              <a:rPr lang="en-US" sz="1800" dirty="0"/>
               <a:t>Screenshots from Jira backlog highlight sprint-based tracking.</a:t>
             </a:r>
           </a:p>
           <a:p>
-            <a:endParaRPr lang="en-IN" sz="1800"/>
+            <a:endParaRPr lang="en-IN" sz="1800" dirty="0"/>
           </a:p>
         </p:txBody>
       </p:sp>
@@ -33283,18 +33640,33 @@
             </a:r>
           </a:p>
           <a:p>
+            <a:pPr>
+              <a:buClr>
+                <a:srgbClr val="00B0F0"/>
+              </a:buClr>
+            </a:pPr>
             <a:r>
               <a:rPr lang="en-US" sz="2000" dirty="0"/>
               <a:t>Organized into Smoke, Sanity, and Regression test cycles.</a:t>
             </a:r>
           </a:p>
           <a:p>
+            <a:pPr>
+              <a:buClr>
+                <a:srgbClr val="00B0F0"/>
+              </a:buClr>
+            </a:pPr>
             <a:r>
               <a:rPr lang="en-US" sz="2000" dirty="0"/>
               <a:t>Clear traceability between requirements, test cases, and execution.</a:t>
             </a:r>
           </a:p>
           <a:p>
+            <a:pPr>
+              <a:buClr>
+                <a:srgbClr val="00B0F0"/>
+              </a:buClr>
+            </a:pPr>
             <a:r>
               <a:rPr lang="en-US" sz="2000" dirty="0"/>
               <a:t>Improved visibility for stakeholders.</a:t>

</xml_diff>